<commit_message>
Final Slides and Module Source Code of Training Sessions.
</commit_message>
<xml_diff>
--- a/Slides/6. Creating a Bootstrap-enabled Form/creating-a-bootstrap-enabled-form-slides.pptx
+++ b/Slides/6. Creating a Bootstrap-enabled Form/creating-a-bootstrap-enabled-form-slides.pptx
@@ -208,7 +208,8 @@
           <a:p>
             <a:fld id="{EF33C652-FC56-4ACE-8AAB-AE3A2B0F2379}" type="datetimeFigureOut">
               <a:rPr lang="en-US" smtClean="0"/>
-              <a:t>7/22/2021</a:t>
+              <a:pPr/>
+              <a:t>7/23/2021</a:t>
             </a:fld>
             <a:endParaRPr lang="en-US"/>
           </a:p>
@@ -369,6 +370,7 @@
           <a:p>
             <a:fld id="{82F0CC37-9885-495D-95E0-0BF758E75C35}" type="slidenum">
               <a:rPr lang="en-US" smtClean="0"/>
+              <a:pPr/>
               <a:t>‹#›</a:t>
             </a:fld>
             <a:endParaRPr lang="en-US"/>
@@ -616,7 +618,8 @@
           <a:p>
             <a:fld id="{9A6612F0-F76F-4388-B561-EFD15264749F}" type="datetime1">
               <a:rPr lang="en-US" smtClean="0"/>
-              <a:t>7/22/2021</a:t>
+              <a:pPr/>
+              <a:t>7/23/2021</a:t>
             </a:fld>
             <a:endParaRPr lang="en-US"/>
           </a:p>
@@ -793,7 +796,8 @@
           <a:p>
             <a:fld id="{CA8B9ECA-AD8E-40B2-B497-28EECEA159C3}" type="datetime1">
               <a:rPr lang="en-US" smtClean="0"/>
-              <a:t>7/22/2021</a:t>
+              <a:pPr/>
+              <a:t>7/23/2021</a:t>
             </a:fld>
             <a:endParaRPr lang="en-US"/>
           </a:p>
@@ -1009,7 +1013,8 @@
           <a:p>
             <a:fld id="{4DB51717-CDD6-4158-8102-E9D1FB142D6A}" type="datetime1">
               <a:rPr lang="en-US" smtClean="0"/>
-              <a:t>7/22/2021</a:t>
+              <a:pPr/>
+              <a:t>7/23/2021</a:t>
             </a:fld>
             <a:endParaRPr lang="en-US"/>
           </a:p>
@@ -1159,7 +1164,8 @@
           <a:p>
             <a:fld id="{951C8804-1544-4E4F-A099-05331457D3BA}" type="datetime1">
               <a:rPr lang="en-US" smtClean="0"/>
-              <a:t>7/22/2021</a:t>
+              <a:pPr/>
+              <a:t>7/23/2021</a:t>
             </a:fld>
             <a:endParaRPr lang="en-US"/>
           </a:p>
@@ -1360,7 +1366,8 @@
           <a:p>
             <a:fld id="{C24DF6C5-F06D-43A4-8465-1206490C299D}" type="datetime1">
               <a:rPr lang="en-US" smtClean="0"/>
-              <a:t>7/22/2021</a:t>
+              <a:pPr/>
+              <a:t>7/23/2021</a:t>
             </a:fld>
             <a:endParaRPr lang="en-US"/>
           </a:p>
@@ -1607,7 +1614,8 @@
           <a:p>
             <a:fld id="{6B964D5B-6302-4F10-8FF1-A0A88E77B954}" type="datetime1">
               <a:rPr lang="en-US" smtClean="0"/>
-              <a:t>7/22/2021</a:t>
+              <a:pPr/>
+              <a:t>7/23/2021</a:t>
             </a:fld>
             <a:endParaRPr lang="en-US"/>
           </a:p>
@@ -2157,6 +2165,13 @@
   <p:clrMapOvr>
     <a:masterClrMapping/>
   </p:clrMapOvr>
+  <p:timing>
+    <p:tnLst>
+      <p:par>
+        <p:cTn id="1" dur="indefinite" restart="never" nodeType="tmRoot"/>
+      </p:par>
+    </p:tnLst>
+  </p:timing>
 </p:sld>
 </file>
 
@@ -2662,6 +2677,13 @@
   <p:clrMapOvr>
     <a:masterClrMapping/>
   </p:clrMapOvr>
+  <p:timing>
+    <p:tnLst>
+      <p:par>
+        <p:cTn id="1" dur="indefinite" restart="never" nodeType="tmRoot"/>
+      </p:par>
+    </p:tnLst>
+  </p:timing>
 </p:sld>
 </file>
 
@@ -3039,6 +3061,13 @@
   <p:clrMapOvr>
     <a:masterClrMapping/>
   </p:clrMapOvr>
+  <p:timing>
+    <p:tnLst>
+      <p:par>
+        <p:cTn id="1" dur="indefinite" restart="never" nodeType="tmRoot"/>
+      </p:par>
+    </p:tnLst>
+  </p:timing>
 </p:sld>
 </file>
 
@@ -3460,6 +3489,13 @@
   <p:clrMapOvr>
     <a:masterClrMapping/>
   </p:clrMapOvr>
+  <p:timing>
+    <p:tnLst>
+      <p:par>
+        <p:cTn id="1" dur="indefinite" restart="never" nodeType="tmRoot"/>
+      </p:par>
+    </p:tnLst>
+  </p:timing>
 </p:sld>
 </file>
 
@@ -4208,6 +4244,13 @@
   <p:clrMapOvr>
     <a:masterClrMapping/>
   </p:clrMapOvr>
+  <p:timing>
+    <p:tnLst>
+      <p:par>
+        <p:cTn id="1" dur="indefinite" restart="never" nodeType="tmRoot"/>
+      </p:par>
+    </p:tnLst>
+  </p:timing>
 </p:sld>
 </file>
 
@@ -4471,6 +4514,13 @@
   <p:clrMapOvr>
     <a:masterClrMapping/>
   </p:clrMapOvr>
+  <p:timing>
+    <p:tnLst>
+      <p:par>
+        <p:cTn id="1" dur="indefinite" restart="never" nodeType="tmRoot"/>
+      </p:par>
+    </p:tnLst>
+  </p:timing>
 </p:sld>
 </file>
 
@@ -4714,6 +4764,13 @@
   <p:clrMapOvr>
     <a:masterClrMapping/>
   </p:clrMapOvr>
+  <p:timing>
+    <p:tnLst>
+      <p:par>
+        <p:cTn id="1" dur="indefinite" restart="never" nodeType="tmRoot"/>
+      </p:par>
+    </p:tnLst>
+  </p:timing>
 </p:sld>
 </file>
 
@@ -5179,6 +5236,13 @@
   <p:clrMapOvr>
     <a:masterClrMapping/>
   </p:clrMapOvr>
+  <p:timing>
+    <p:tnLst>
+      <p:par>
+        <p:cTn id="1" dur="indefinite" restart="never" nodeType="tmRoot"/>
+      </p:par>
+    </p:tnLst>
+  </p:timing>
 </p:sld>
 </file>
 
@@ -5634,6 +5698,13 @@
   <p:clrMapOvr>
     <a:masterClrMapping/>
   </p:clrMapOvr>
+  <p:timing>
+    <p:tnLst>
+      <p:par>
+        <p:cTn id="1" dur="indefinite" restart="never" nodeType="tmRoot"/>
+      </p:par>
+    </p:tnLst>
+  </p:timing>
 </p:sld>
 </file>
 
@@ -6001,6 +6072,13 @@
   <p:clrMapOvr>
     <a:masterClrMapping/>
   </p:clrMapOvr>
+  <p:timing>
+    <p:tnLst>
+      <p:par>
+        <p:cTn id="1" dur="indefinite" restart="never" nodeType="tmRoot"/>
+      </p:par>
+    </p:tnLst>
+  </p:timing>
 </p:sld>
 </file>
 
@@ -6144,6 +6222,13 @@
   <p:clrMapOvr>
     <a:masterClrMapping/>
   </p:clrMapOvr>
+  <p:timing>
+    <p:tnLst>
+      <p:par>
+        <p:cTn id="1" dur="indefinite" restart="never" nodeType="tmRoot"/>
+      </p:par>
+    </p:tnLst>
+  </p:timing>
 </p:sld>
 </file>
 
@@ -6334,6 +6419,13 @@
   <p:clrMapOvr>
     <a:masterClrMapping/>
   </p:clrMapOvr>
+  <p:timing>
+    <p:tnLst>
+      <p:par>
+        <p:cTn id="1" dur="indefinite" restart="never" nodeType="tmRoot"/>
+      </p:par>
+    </p:tnLst>
+  </p:timing>
 </p:sld>
 </file>
 
@@ -6838,6 +6930,13 @@
   <p:clrMapOvr>
     <a:masterClrMapping/>
   </p:clrMapOvr>
+  <p:timing>
+    <p:tnLst>
+      <p:par>
+        <p:cTn id="1" dur="indefinite" restart="never" nodeType="tmRoot"/>
+      </p:par>
+    </p:tnLst>
+  </p:timing>
 </p:sld>
 </file>
 
@@ -7458,28 +7557,6 @@
           </a:p>
         </p:txBody>
       </p:sp>
-      <p:pic>
-        <p:nvPicPr>
-          <p:cNvPr id="4" name="object 4"/>
-          <p:cNvPicPr/>
-          <p:nvPr/>
-        </p:nvPicPr>
-        <p:blipFill>
-          <a:blip r:embed="rId2" cstate="print"/>
-          <a:stretch>
-            <a:fillRect/>
-          </a:stretch>
-        </p:blipFill>
-        <p:spPr>
-          <a:xfrm>
-            <a:off x="8178508" y="2476367"/>
-            <a:ext cx="2905529" cy="1838581"/>
-          </a:xfrm>
-          <a:prstGeom prst="rect">
-            <a:avLst/>
-          </a:prstGeom>
-        </p:spPr>
-      </p:pic>
       <p:sp>
         <p:nvSpPr>
           <p:cNvPr id="5" name="Slide Number Placeholder 4"/>
@@ -7509,6 +7586,13 @@
   <p:clrMapOvr>
     <a:masterClrMapping/>
   </p:clrMapOvr>
+  <p:timing>
+    <p:tnLst>
+      <p:par>
+        <p:cTn id="1" dur="indefinite" restart="never" nodeType="tmRoot"/>
+      </p:par>
+    </p:tnLst>
+  </p:timing>
 </p:sld>
 </file>
 
@@ -7992,6 +8076,13 @@
   <p:clrMapOvr>
     <a:masterClrMapping/>
   </p:clrMapOvr>
+  <p:timing>
+    <p:tnLst>
+      <p:par>
+        <p:cTn id="1" dur="indefinite" restart="never" nodeType="tmRoot"/>
+      </p:par>
+    </p:tnLst>
+  </p:timing>
 </p:sld>
 </file>
 
@@ -8235,6 +8326,13 @@
   <p:clrMapOvr>
     <a:masterClrMapping/>
   </p:clrMapOvr>
+  <p:timing>
+    <p:tnLst>
+      <p:par>
+        <p:cTn id="1" dur="indefinite" restart="never" nodeType="tmRoot"/>
+      </p:par>
+    </p:tnLst>
+  </p:timing>
 </p:sld>
 </file>
 
@@ -8382,6 +8480,13 @@
   <p:clrMapOvr>
     <a:masterClrMapping/>
   </p:clrMapOvr>
+  <p:timing>
+    <p:tnLst>
+      <p:par>
+        <p:cTn id="1" dur="indefinite" restart="never" nodeType="tmRoot"/>
+      </p:par>
+    </p:tnLst>
+  </p:timing>
 </p:sld>
 </file>
 

</xml_diff>